<commit_message>
figure 4 panel tags to upper
</commit_message>
<xml_diff>
--- a/Results/Figures/figure_04.pptx
+++ b/Results/Figures/figure_04.pptx
@@ -123,16 +123,64 @@
 </p:presentation>
 </file>
 
-<file path=ppt/revisionInfo.xml><?xml version="1.0" encoding="utf-8"?>
-<p1510:revInfo xmlns:a="http://schemas.openxmlformats.org/drawingml/2006/main" xmlns:r="http://schemas.openxmlformats.org/officeDocument/2006/relationships" xmlns:p1510="http://schemas.microsoft.com/office/powerpoint/2015/10/main">
-  <p1510:revLst>
-    <p1510:client id="{545DF808-1DAB-4F9B-95AF-7EC5D35BFD0B}" v="18" dt="2024-11-20T21:26:39.620"/>
-  </p1510:revLst>
-</p1510:revInfo>
-</file>
-
 <file path=ppt/changesInfos/changesInfo1.xml><?xml version="1.0" encoding="utf-8"?>
 <pc:chgInfo xmlns:a="http://schemas.openxmlformats.org/drawingml/2006/main" xmlns:r="http://schemas.openxmlformats.org/officeDocument/2006/relationships" xmlns:ac="http://schemas.microsoft.com/office/drawing/2013/main/command" xmlns:pc="http://schemas.microsoft.com/office/powerpoint/2013/main/command">
+  <pc:docChgLst>
+    <pc:chgData name="Gilbert, Neil" userId="37be9f5c-8f28-415b-96d6-624acf93bb3f" providerId="ADAL" clId="{58ECA877-5A44-417D-9F70-19BA7C32A50C}"/>
+    <pc:docChg chg="undo custSel modSld">
+      <pc:chgData name="Gilbert, Neil" userId="37be9f5c-8f28-415b-96d6-624acf93bb3f" providerId="ADAL" clId="{58ECA877-5A44-417D-9F70-19BA7C32A50C}" dt="2024-12-09T18:08:21.259" v="17" actId="2711"/>
+      <pc:docMkLst>
+        <pc:docMk/>
+      </pc:docMkLst>
+      <pc:sldChg chg="modSp mod">
+        <pc:chgData name="Gilbert, Neil" userId="37be9f5c-8f28-415b-96d6-624acf93bb3f" providerId="ADAL" clId="{58ECA877-5A44-417D-9F70-19BA7C32A50C}" dt="2024-12-09T18:08:21.259" v="17" actId="2711"/>
+        <pc:sldMkLst>
+          <pc:docMk/>
+          <pc:sldMk cId="2274438376" sldId="256"/>
+        </pc:sldMkLst>
+        <pc:spChg chg="mod">
+          <ac:chgData name="Gilbert, Neil" userId="37be9f5c-8f28-415b-96d6-624acf93bb3f" providerId="ADAL" clId="{58ECA877-5A44-417D-9F70-19BA7C32A50C}" dt="2024-12-09T18:07:36.626" v="4" actId="2711"/>
+          <ac:spMkLst>
+            <pc:docMk/>
+            <pc:sldMk cId="2274438376" sldId="256"/>
+            <ac:spMk id="26" creationId="{C251790D-0AA1-D604-9E1B-305ABBF4338A}"/>
+          </ac:spMkLst>
+        </pc:spChg>
+        <pc:spChg chg="mod">
+          <ac:chgData name="Gilbert, Neil" userId="37be9f5c-8f28-415b-96d6-624acf93bb3f" providerId="ADAL" clId="{58ECA877-5A44-417D-9F70-19BA7C32A50C}" dt="2024-12-09T18:07:49.421" v="7" actId="2711"/>
+          <ac:spMkLst>
+            <pc:docMk/>
+            <pc:sldMk cId="2274438376" sldId="256"/>
+            <ac:spMk id="27" creationId="{3D717055-F7E1-719C-8D0A-03218046D726}"/>
+          </ac:spMkLst>
+        </pc:spChg>
+        <pc:spChg chg="mod">
+          <ac:chgData name="Gilbert, Neil" userId="37be9f5c-8f28-415b-96d6-624acf93bb3f" providerId="ADAL" clId="{58ECA877-5A44-417D-9F70-19BA7C32A50C}" dt="2024-12-09T18:08:00.085" v="9" actId="2711"/>
+          <ac:spMkLst>
+            <pc:docMk/>
+            <pc:sldMk cId="2274438376" sldId="256"/>
+            <ac:spMk id="28" creationId="{CEC6E966-7BBC-1CE5-5BCE-F2D752AF60A9}"/>
+          </ac:spMkLst>
+        </pc:spChg>
+        <pc:spChg chg="mod">
+          <ac:chgData name="Gilbert, Neil" userId="37be9f5c-8f28-415b-96d6-624acf93bb3f" providerId="ADAL" clId="{58ECA877-5A44-417D-9F70-19BA7C32A50C}" dt="2024-12-09T18:08:11.391" v="12" actId="2711"/>
+          <ac:spMkLst>
+            <pc:docMk/>
+            <pc:sldMk cId="2274438376" sldId="256"/>
+            <ac:spMk id="29" creationId="{13E65F7A-DDDE-FD54-FA90-672600F349E5}"/>
+          </ac:spMkLst>
+        </pc:spChg>
+        <pc:spChg chg="mod">
+          <ac:chgData name="Gilbert, Neil" userId="37be9f5c-8f28-415b-96d6-624acf93bb3f" providerId="ADAL" clId="{58ECA877-5A44-417D-9F70-19BA7C32A50C}" dt="2024-12-09T18:08:21.259" v="17" actId="2711"/>
+          <ac:spMkLst>
+            <pc:docMk/>
+            <pc:sldMk cId="2274438376" sldId="256"/>
+            <ac:spMk id="30" creationId="{F03526F6-5615-6765-4FB9-9F92C5EA44C4}"/>
+          </ac:spMkLst>
+        </pc:spChg>
+      </pc:sldChg>
+    </pc:docChg>
+  </pc:docChgLst>
   <pc:docChgLst>
     <pc:chgData name="Gilbert, Neil" userId="37be9f5c-8f28-415b-96d6-624acf93bb3f" providerId="ADAL" clId="{545DF808-1DAB-4F9B-95AF-7EC5D35BFD0B}"/>
     <pc:docChg chg="undo custSel modSld">
@@ -218,68 +266,12 @@
             <ac:spMk id="30" creationId="{F03526F6-5615-6765-4FB9-9F92C5EA44C4}"/>
           </ac:spMkLst>
         </pc:spChg>
-        <pc:spChg chg="mod topLvl">
-          <ac:chgData name="Gilbert, Neil" userId="37be9f5c-8f28-415b-96d6-624acf93bb3f" providerId="ADAL" clId="{545DF808-1DAB-4F9B-95AF-7EC5D35BFD0B}" dt="2024-11-20T21:26:19.208" v="385" actId="164"/>
-          <ac:spMkLst>
-            <pc:docMk/>
-            <pc:sldMk cId="2274438376" sldId="256"/>
-            <ac:spMk id="37" creationId="{09AAD42A-D1A1-5E25-0577-91BBBACCF585}"/>
-          </ac:spMkLst>
-        </pc:spChg>
-        <pc:spChg chg="mod topLvl">
-          <ac:chgData name="Gilbert, Neil" userId="37be9f5c-8f28-415b-96d6-624acf93bb3f" providerId="ADAL" clId="{545DF808-1DAB-4F9B-95AF-7EC5D35BFD0B}" dt="2024-11-20T21:26:19.208" v="385" actId="164"/>
-          <ac:spMkLst>
-            <pc:docMk/>
-            <pc:sldMk cId="2274438376" sldId="256"/>
-            <ac:spMk id="40" creationId="{1B8B7562-665E-5FF8-C0FE-85FAAE7F7B07}"/>
-          </ac:spMkLst>
-        </pc:spChg>
-        <pc:spChg chg="mod topLvl">
-          <ac:chgData name="Gilbert, Neil" userId="37be9f5c-8f28-415b-96d6-624acf93bb3f" providerId="ADAL" clId="{545DF808-1DAB-4F9B-95AF-7EC5D35BFD0B}" dt="2024-11-20T21:26:19.208" v="385" actId="164"/>
-          <ac:spMkLst>
-            <pc:docMk/>
-            <pc:sldMk cId="2274438376" sldId="256"/>
-            <ac:spMk id="42" creationId="{EB414946-9540-9E0E-9B47-BC41121B44B3}"/>
-          </ac:spMkLst>
-        </pc:spChg>
-        <pc:spChg chg="mod topLvl">
-          <ac:chgData name="Gilbert, Neil" userId="37be9f5c-8f28-415b-96d6-624acf93bb3f" providerId="ADAL" clId="{545DF808-1DAB-4F9B-95AF-7EC5D35BFD0B}" dt="2024-11-20T21:26:19.208" v="385" actId="164"/>
-          <ac:spMkLst>
-            <pc:docMk/>
-            <pc:sldMk cId="2274438376" sldId="256"/>
-            <ac:spMk id="45" creationId="{C251790D-0AA1-D604-9E1B-305ABBF4338A}"/>
-          </ac:spMkLst>
-        </pc:spChg>
-        <pc:spChg chg="mod topLvl">
-          <ac:chgData name="Gilbert, Neil" userId="37be9f5c-8f28-415b-96d6-624acf93bb3f" providerId="ADAL" clId="{545DF808-1DAB-4F9B-95AF-7EC5D35BFD0B}" dt="2024-11-20T21:26:19.208" v="385" actId="164"/>
-          <ac:spMkLst>
-            <pc:docMk/>
-            <pc:sldMk cId="2274438376" sldId="256"/>
-            <ac:spMk id="48" creationId="{3D717055-F7E1-719C-8D0A-03218046D726}"/>
-          </ac:spMkLst>
-        </pc:spChg>
-        <pc:spChg chg="mod topLvl">
-          <ac:chgData name="Gilbert, Neil" userId="37be9f5c-8f28-415b-96d6-624acf93bb3f" providerId="ADAL" clId="{545DF808-1DAB-4F9B-95AF-7EC5D35BFD0B}" dt="2024-11-20T21:26:19.208" v="385" actId="164"/>
-          <ac:spMkLst>
-            <pc:docMk/>
-            <pc:sldMk cId="2274438376" sldId="256"/>
-            <ac:spMk id="49" creationId="{CEC6E966-7BBC-1CE5-5BCE-F2D752AF60A9}"/>
-          </ac:spMkLst>
-        </pc:spChg>
         <pc:spChg chg="mod">
           <ac:chgData name="Gilbert, Neil" userId="37be9f5c-8f28-415b-96d6-624acf93bb3f" providerId="ADAL" clId="{545DF808-1DAB-4F9B-95AF-7EC5D35BFD0B}" dt="2024-11-20T21:26:39.620" v="387"/>
           <ac:spMkLst>
             <pc:docMk/>
             <pc:sldMk cId="2274438376" sldId="256"/>
             <ac:spMk id="50" creationId="{09AAD42A-D1A1-5E25-0577-91BBBACCF585}"/>
-          </ac:spMkLst>
-        </pc:spChg>
-        <pc:spChg chg="mod topLvl">
-          <ac:chgData name="Gilbert, Neil" userId="37be9f5c-8f28-415b-96d6-624acf93bb3f" providerId="ADAL" clId="{545DF808-1DAB-4F9B-95AF-7EC5D35BFD0B}" dt="2024-11-20T21:26:19.208" v="385" actId="164"/>
-          <ac:spMkLst>
-            <pc:docMk/>
-            <pc:sldMk cId="2274438376" sldId="256"/>
-            <ac:spMk id="51" creationId="{13E65F7A-DDDE-FD54-FA90-672600F349E5}"/>
           </ac:spMkLst>
         </pc:spChg>
         <pc:spChg chg="mod">
@@ -290,100 +282,12 @@
             <ac:spMk id="53" creationId="{1B8B7562-665E-5FF8-C0FE-85FAAE7F7B07}"/>
           </ac:spMkLst>
         </pc:spChg>
-        <pc:spChg chg="mod topLvl">
-          <ac:chgData name="Gilbert, Neil" userId="37be9f5c-8f28-415b-96d6-624acf93bb3f" providerId="ADAL" clId="{545DF808-1DAB-4F9B-95AF-7EC5D35BFD0B}" dt="2024-11-20T21:26:19.208" v="385" actId="164"/>
-          <ac:spMkLst>
-            <pc:docMk/>
-            <pc:sldMk cId="2274438376" sldId="256"/>
-            <ac:spMk id="54" creationId="{F03526F6-5615-6765-4FB9-9F92C5EA44C4}"/>
-          </ac:spMkLst>
-        </pc:spChg>
         <pc:spChg chg="mod">
           <ac:chgData name="Gilbert, Neil" userId="37be9f5c-8f28-415b-96d6-624acf93bb3f" providerId="ADAL" clId="{545DF808-1DAB-4F9B-95AF-7EC5D35BFD0B}" dt="2024-11-20T21:26:39.620" v="387"/>
           <ac:spMkLst>
             <pc:docMk/>
             <pc:sldMk cId="2274438376" sldId="256"/>
             <ac:spMk id="55" creationId="{EB414946-9540-9E0E-9B47-BC41121B44B3}"/>
-          </ac:spMkLst>
-        </pc:spChg>
-        <pc:spChg chg="mod topLvl">
-          <ac:chgData name="Gilbert, Neil" userId="37be9f5c-8f28-415b-96d6-624acf93bb3f" providerId="ADAL" clId="{545DF808-1DAB-4F9B-95AF-7EC5D35BFD0B}" dt="2024-11-20T21:26:19.208" v="385" actId="164"/>
-          <ac:spMkLst>
-            <pc:docMk/>
-            <pc:sldMk cId="2274438376" sldId="256"/>
-            <ac:spMk id="63" creationId="{1239E492-CCFB-8F05-3B28-1BFEA5006121}"/>
-          </ac:spMkLst>
-        </pc:spChg>
-        <pc:spChg chg="mod">
-          <ac:chgData name="Gilbert, Neil" userId="37be9f5c-8f28-415b-96d6-624acf93bb3f" providerId="ADAL" clId="{545DF808-1DAB-4F9B-95AF-7EC5D35BFD0B}" dt="2024-11-07T16:52:50.854" v="7" actId="165"/>
-          <ac:spMkLst>
-            <pc:docMk/>
-            <pc:sldMk cId="2274438376" sldId="256"/>
-            <ac:spMk id="64" creationId="{A3E5B1CD-16C2-E3C8-5385-FCD882A55351}"/>
-          </ac:spMkLst>
-        </pc:spChg>
-        <pc:spChg chg="mod">
-          <ac:chgData name="Gilbert, Neil" userId="37be9f5c-8f28-415b-96d6-624acf93bb3f" providerId="ADAL" clId="{545DF808-1DAB-4F9B-95AF-7EC5D35BFD0B}" dt="2024-11-07T16:52:50.854" v="7" actId="165"/>
-          <ac:spMkLst>
-            <pc:docMk/>
-            <pc:sldMk cId="2274438376" sldId="256"/>
-            <ac:spMk id="66" creationId="{D6AACA2C-D4C9-BF68-1243-C4F5FE95E9E8}"/>
-          </ac:spMkLst>
-        </pc:spChg>
-        <pc:spChg chg="mod">
-          <ac:chgData name="Gilbert, Neil" userId="37be9f5c-8f28-415b-96d6-624acf93bb3f" providerId="ADAL" clId="{545DF808-1DAB-4F9B-95AF-7EC5D35BFD0B}" dt="2024-11-07T16:52:50.854" v="7" actId="165"/>
-          <ac:spMkLst>
-            <pc:docMk/>
-            <pc:sldMk cId="2274438376" sldId="256"/>
-            <ac:spMk id="67" creationId="{EA2EF6E1-1B81-0DD3-F308-C4DD645CD0AC}"/>
-          </ac:spMkLst>
-        </pc:spChg>
-        <pc:spChg chg="mod">
-          <ac:chgData name="Gilbert, Neil" userId="37be9f5c-8f28-415b-96d6-624acf93bb3f" providerId="ADAL" clId="{545DF808-1DAB-4F9B-95AF-7EC5D35BFD0B}" dt="2024-11-07T16:54:31.540" v="9"/>
-          <ac:spMkLst>
-            <pc:docMk/>
-            <pc:sldMk cId="2274438376" sldId="256"/>
-            <ac:spMk id="72" creationId="{09AAD42A-D1A1-5E25-0577-91BBBACCF585}"/>
-          </ac:spMkLst>
-        </pc:spChg>
-        <pc:spChg chg="mod">
-          <ac:chgData name="Gilbert, Neil" userId="37be9f5c-8f28-415b-96d6-624acf93bb3f" providerId="ADAL" clId="{545DF808-1DAB-4F9B-95AF-7EC5D35BFD0B}" dt="2024-11-07T16:54:31.540" v="9"/>
-          <ac:spMkLst>
-            <pc:docMk/>
-            <pc:sldMk cId="2274438376" sldId="256"/>
-            <ac:spMk id="74" creationId="{1B8B7562-665E-5FF8-C0FE-85FAAE7F7B07}"/>
-          </ac:spMkLst>
-        </pc:spChg>
-        <pc:spChg chg="mod">
-          <ac:chgData name="Gilbert, Neil" userId="37be9f5c-8f28-415b-96d6-624acf93bb3f" providerId="ADAL" clId="{545DF808-1DAB-4F9B-95AF-7EC5D35BFD0B}" dt="2024-11-07T16:54:31.540" v="9"/>
-          <ac:spMkLst>
-            <pc:docMk/>
-            <pc:sldMk cId="2274438376" sldId="256"/>
-            <ac:spMk id="75" creationId="{EB414946-9540-9E0E-9B47-BC41121B44B3}"/>
-          </ac:spMkLst>
-        </pc:spChg>
-        <pc:spChg chg="mod">
-          <ac:chgData name="Gilbert, Neil" userId="37be9f5c-8f28-415b-96d6-624acf93bb3f" providerId="ADAL" clId="{545DF808-1DAB-4F9B-95AF-7EC5D35BFD0B}" dt="2024-11-07T16:54:31.540" v="9"/>
-          <ac:spMkLst>
-            <pc:docMk/>
-            <pc:sldMk cId="2274438376" sldId="256"/>
-            <ac:spMk id="76" creationId="{A3E5B1CD-16C2-E3C8-5385-FCD882A55351}"/>
-          </ac:spMkLst>
-        </pc:spChg>
-        <pc:spChg chg="mod">
-          <ac:chgData name="Gilbert, Neil" userId="37be9f5c-8f28-415b-96d6-624acf93bb3f" providerId="ADAL" clId="{545DF808-1DAB-4F9B-95AF-7EC5D35BFD0B}" dt="2024-11-07T16:54:31.540" v="9"/>
-          <ac:spMkLst>
-            <pc:docMk/>
-            <pc:sldMk cId="2274438376" sldId="256"/>
-            <ac:spMk id="78" creationId="{D6AACA2C-D4C9-BF68-1243-C4F5FE95E9E8}"/>
-          </ac:spMkLst>
-        </pc:spChg>
-        <pc:spChg chg="mod">
-          <ac:chgData name="Gilbert, Neil" userId="37be9f5c-8f28-415b-96d6-624acf93bb3f" providerId="ADAL" clId="{545DF808-1DAB-4F9B-95AF-7EC5D35BFD0B}" dt="2024-11-07T16:54:31.540" v="9"/>
-          <ac:spMkLst>
-            <pc:docMk/>
-            <pc:sldMk cId="2274438376" sldId="256"/>
-            <ac:spMk id="79" creationId="{EA2EF6E1-1B81-0DD3-F308-C4DD645CD0AC}"/>
           </ac:spMkLst>
         </pc:spChg>
         <pc:spChg chg="mod">
@@ -434,14 +338,6 @@
             <ac:spMk id="87" creationId="{EA2EF6E1-1B81-0DD3-F308-C4DD645CD0AC}"/>
           </ac:spMkLst>
         </pc:spChg>
-        <pc:grpChg chg="add del mod">
-          <ac:chgData name="Gilbert, Neil" userId="37be9f5c-8f28-415b-96d6-624acf93bb3f" providerId="ADAL" clId="{545DF808-1DAB-4F9B-95AF-7EC5D35BFD0B}" dt="2024-11-20T21:26:30.714" v="386" actId="21"/>
-          <ac:grpSpMkLst>
-            <pc:docMk/>
-            <pc:sldMk cId="2274438376" sldId="256"/>
-            <ac:grpSpMk id="13" creationId="{50ADBE48-36C7-F418-32B1-54CC27C7D0D7}"/>
-          </ac:grpSpMkLst>
-        </pc:grpChg>
         <pc:grpChg chg="add mod">
           <ac:chgData name="Gilbert, Neil" userId="37be9f5c-8f28-415b-96d6-624acf93bb3f" providerId="ADAL" clId="{545DF808-1DAB-4F9B-95AF-7EC5D35BFD0B}" dt="2024-11-20T21:26:46.834" v="388" actId="1076"/>
           <ac:grpSpMkLst>
@@ -466,38 +362,6 @@
             <ac:grpSpMk id="31" creationId="{337567D1-27BE-6AD9-C41B-917F986071A3}"/>
           </ac:grpSpMkLst>
         </pc:grpChg>
-        <pc:grpChg chg="del">
-          <ac:chgData name="Gilbert, Neil" userId="37be9f5c-8f28-415b-96d6-624acf93bb3f" providerId="ADAL" clId="{545DF808-1DAB-4F9B-95AF-7EC5D35BFD0B}" dt="2024-11-07T16:51:20.570" v="0" actId="21"/>
-          <ac:grpSpMkLst>
-            <pc:docMk/>
-            <pc:sldMk cId="2274438376" sldId="256"/>
-            <ac:grpSpMk id="33" creationId="{F136E2E0-691B-E588-B9B7-936536DF47FC}"/>
-          </ac:grpSpMkLst>
-        </pc:grpChg>
-        <pc:grpChg chg="add del mod">
-          <ac:chgData name="Gilbert, Neil" userId="37be9f5c-8f28-415b-96d6-624acf93bb3f" providerId="ADAL" clId="{545DF808-1DAB-4F9B-95AF-7EC5D35BFD0B}" dt="2024-11-07T16:52:50.854" v="7" actId="165"/>
-          <ac:grpSpMkLst>
-            <pc:docMk/>
-            <pc:sldMk cId="2274438376" sldId="256"/>
-            <ac:grpSpMk id="34" creationId="{F136E2E0-691B-E588-B9B7-936536DF47FC}"/>
-          </ac:grpSpMkLst>
-        </pc:grpChg>
-        <pc:grpChg chg="mod topLvl">
-          <ac:chgData name="Gilbert, Neil" userId="37be9f5c-8f28-415b-96d6-624acf93bb3f" providerId="ADAL" clId="{545DF808-1DAB-4F9B-95AF-7EC5D35BFD0B}" dt="2024-11-20T21:26:19.208" v="385" actId="164"/>
-          <ac:grpSpMkLst>
-            <pc:docMk/>
-            <pc:sldMk cId="2274438376" sldId="256"/>
-            <ac:grpSpMk id="35" creationId="{FA916D9B-43AC-AD47-46C0-36529DEF91C0}"/>
-          </ac:grpSpMkLst>
-        </pc:grpChg>
-        <pc:grpChg chg="del mod topLvl">
-          <ac:chgData name="Gilbert, Neil" userId="37be9f5c-8f28-415b-96d6-624acf93bb3f" providerId="ADAL" clId="{545DF808-1DAB-4F9B-95AF-7EC5D35BFD0B}" dt="2024-11-07T16:52:57.232" v="8" actId="165"/>
-          <ac:grpSpMkLst>
-            <pc:docMk/>
-            <pc:sldMk cId="2274438376" sldId="256"/>
-            <ac:grpSpMk id="44" creationId="{54D7B2F1-6305-FBB1-6D24-E1D7B239E00F}"/>
-          </ac:grpSpMkLst>
-        </pc:grpChg>
         <pc:grpChg chg="mod">
           <ac:chgData name="Gilbert, Neil" userId="37be9f5c-8f28-415b-96d6-624acf93bb3f" providerId="ADAL" clId="{545DF808-1DAB-4F9B-95AF-7EC5D35BFD0B}" dt="2024-11-20T21:26:39.620" v="387"/>
           <ac:grpSpMkLst>
@@ -506,54 +370,6 @@
             <ac:grpSpMk id="47" creationId="{FA916D9B-43AC-AD47-46C0-36529DEF91C0}"/>
           </ac:grpSpMkLst>
         </pc:grpChg>
-        <pc:grpChg chg="add del mod topLvl">
-          <ac:chgData name="Gilbert, Neil" userId="37be9f5c-8f28-415b-96d6-624acf93bb3f" providerId="ADAL" clId="{545DF808-1DAB-4F9B-95AF-7EC5D35BFD0B}" dt="2024-11-20T21:21:14.265" v="68" actId="165"/>
-          <ac:grpSpMkLst>
-            <pc:docMk/>
-            <pc:sldMk cId="2274438376" sldId="256"/>
-            <ac:grpSpMk id="56" creationId="{03C59577-3738-E6C4-4D54-AA13BFECDF43}"/>
-          </ac:grpSpMkLst>
-        </pc:grpChg>
-        <pc:grpChg chg="del mod topLvl">
-          <ac:chgData name="Gilbert, Neil" userId="37be9f5c-8f28-415b-96d6-624acf93bb3f" providerId="ADAL" clId="{545DF808-1DAB-4F9B-95AF-7EC5D35BFD0B}" dt="2024-11-20T21:21:18.876" v="69" actId="165"/>
-          <ac:grpSpMkLst>
-            <pc:docMk/>
-            <pc:sldMk cId="2274438376" sldId="256"/>
-            <ac:grpSpMk id="57" creationId="{9BB301FA-0045-521E-AC08-92A7EB51AC70}"/>
-          </ac:grpSpMkLst>
-        </pc:grpChg>
-        <pc:grpChg chg="add mod">
-          <ac:chgData name="Gilbert, Neil" userId="37be9f5c-8f28-415b-96d6-624acf93bb3f" providerId="ADAL" clId="{545DF808-1DAB-4F9B-95AF-7EC5D35BFD0B}" dt="2024-11-20T21:26:19.208" v="385" actId="164"/>
-          <ac:grpSpMkLst>
-            <pc:docMk/>
-            <pc:sldMk cId="2274438376" sldId="256"/>
-            <ac:grpSpMk id="70" creationId="{337567D1-27BE-6AD9-C41B-917F986071A3}"/>
-          </ac:grpSpMkLst>
-        </pc:grpChg>
-        <pc:grpChg chg="mod">
-          <ac:chgData name="Gilbert, Neil" userId="37be9f5c-8f28-415b-96d6-624acf93bb3f" providerId="ADAL" clId="{545DF808-1DAB-4F9B-95AF-7EC5D35BFD0B}" dt="2024-11-07T16:54:31.540" v="9"/>
-          <ac:grpSpMkLst>
-            <pc:docMk/>
-            <pc:sldMk cId="2274438376" sldId="256"/>
-            <ac:grpSpMk id="71" creationId="{FA916D9B-43AC-AD47-46C0-36529DEF91C0}"/>
-          </ac:grpSpMkLst>
-        </pc:grpChg>
-        <pc:picChg chg="add mod ord">
-          <ac:chgData name="Gilbert, Neil" userId="37be9f5c-8f28-415b-96d6-624acf93bb3f" providerId="ADAL" clId="{545DF808-1DAB-4F9B-95AF-7EC5D35BFD0B}" dt="2024-11-20T21:26:19.208" v="385" actId="164"/>
-          <ac:picMkLst>
-            <pc:docMk/>
-            <pc:sldMk cId="2274438376" sldId="256"/>
-            <ac:picMk id="3" creationId="{CA051D8C-76F8-3D6B-6ABA-A299280F8CB7}"/>
-          </ac:picMkLst>
-        </pc:picChg>
-        <pc:picChg chg="add mod ord">
-          <ac:chgData name="Gilbert, Neil" userId="37be9f5c-8f28-415b-96d6-624acf93bb3f" providerId="ADAL" clId="{545DF808-1DAB-4F9B-95AF-7EC5D35BFD0B}" dt="2024-11-20T21:26:19.208" v="385" actId="164"/>
-          <ac:picMkLst>
-            <pc:docMk/>
-            <pc:sldMk cId="2274438376" sldId="256"/>
-            <ac:picMk id="4" creationId="{F041AB7B-E01E-E762-5A3B-0D6EACCF47DD}"/>
-          </ac:picMkLst>
-        </pc:picChg>
         <pc:picChg chg="mod">
           <ac:chgData name="Gilbert, Neil" userId="37be9f5c-8f28-415b-96d6-624acf93bb3f" providerId="ADAL" clId="{545DF808-1DAB-4F9B-95AF-7EC5D35BFD0B}" dt="2024-11-20T21:26:39.620" v="387"/>
           <ac:picMkLst>
@@ -570,78 +386,6 @@
             <ac:picMk id="16" creationId="{CA051D8C-76F8-3D6B-6ABA-A299280F8CB7}"/>
           </ac:picMkLst>
         </pc:picChg>
-        <pc:picChg chg="add del mod ord topLvl">
-          <ac:chgData name="Gilbert, Neil" userId="37be9f5c-8f28-415b-96d6-624acf93bb3f" providerId="ADAL" clId="{545DF808-1DAB-4F9B-95AF-7EC5D35BFD0B}" dt="2024-11-13T16:45:53.073" v="23" actId="478"/>
-          <ac:picMkLst>
-            <pc:docMk/>
-            <pc:sldMk cId="2274438376" sldId="256"/>
-            <ac:picMk id="55" creationId="{9FEDBAF4-2B51-D922-B1B2-241CC2395AB0}"/>
-          </ac:picMkLst>
-        </pc:picChg>
-        <pc:picChg chg="del mod topLvl">
-          <ac:chgData name="Gilbert, Neil" userId="37be9f5c-8f28-415b-96d6-624acf93bb3f" providerId="ADAL" clId="{545DF808-1DAB-4F9B-95AF-7EC5D35BFD0B}" dt="2024-11-20T21:21:20.447" v="70" actId="478"/>
-          <ac:picMkLst>
-            <pc:docMk/>
-            <pc:sldMk cId="2274438376" sldId="256"/>
-            <ac:picMk id="62" creationId="{06891639-7B6E-0AC3-EF6D-526ED0A800DD}"/>
-          </ac:picMkLst>
-        </pc:picChg>
-        <pc:cxnChg chg="add mod">
-          <ac:chgData name="Gilbert, Neil" userId="37be9f5c-8f28-415b-96d6-624acf93bb3f" providerId="ADAL" clId="{545DF808-1DAB-4F9B-95AF-7EC5D35BFD0B}" dt="2024-11-20T21:26:19.208" v="385" actId="164"/>
-          <ac:cxnSpMkLst>
-            <pc:docMk/>
-            <pc:sldMk cId="2274438376" sldId="256"/>
-            <ac:cxnSpMk id="6" creationId="{76478CF5-D66A-864E-0545-754861328290}"/>
-          </ac:cxnSpMkLst>
-        </pc:cxnChg>
-        <pc:cxnChg chg="add mod">
-          <ac:chgData name="Gilbert, Neil" userId="37be9f5c-8f28-415b-96d6-624acf93bb3f" providerId="ADAL" clId="{545DF808-1DAB-4F9B-95AF-7EC5D35BFD0B}" dt="2024-11-20T21:26:19.208" v="385" actId="164"/>
-          <ac:cxnSpMkLst>
-            <pc:docMk/>
-            <pc:sldMk cId="2274438376" sldId="256"/>
-            <ac:cxnSpMk id="7" creationId="{98AF517D-BDB0-D667-6E8B-44196B779148}"/>
-          </ac:cxnSpMkLst>
-        </pc:cxnChg>
-        <pc:cxnChg chg="add mod">
-          <ac:chgData name="Gilbert, Neil" userId="37be9f5c-8f28-415b-96d6-624acf93bb3f" providerId="ADAL" clId="{545DF808-1DAB-4F9B-95AF-7EC5D35BFD0B}" dt="2024-11-20T21:26:19.208" v="385" actId="164"/>
-          <ac:cxnSpMkLst>
-            <pc:docMk/>
-            <pc:sldMk cId="2274438376" sldId="256"/>
-            <ac:cxnSpMk id="8" creationId="{67FC8DFA-9CAD-C6C3-F9B7-A30ABF8F7ADB}"/>
-          </ac:cxnSpMkLst>
-        </pc:cxnChg>
-        <pc:cxnChg chg="add mod">
-          <ac:chgData name="Gilbert, Neil" userId="37be9f5c-8f28-415b-96d6-624acf93bb3f" providerId="ADAL" clId="{545DF808-1DAB-4F9B-95AF-7EC5D35BFD0B}" dt="2024-11-20T21:26:19.208" v="385" actId="164"/>
-          <ac:cxnSpMkLst>
-            <pc:docMk/>
-            <pc:sldMk cId="2274438376" sldId="256"/>
-            <ac:cxnSpMk id="9" creationId="{AC65409D-2EEC-F363-E75B-3AAB3BE7C2C3}"/>
-          </ac:cxnSpMkLst>
-        </pc:cxnChg>
-        <pc:cxnChg chg="add mod">
-          <ac:chgData name="Gilbert, Neil" userId="37be9f5c-8f28-415b-96d6-624acf93bb3f" providerId="ADAL" clId="{545DF808-1DAB-4F9B-95AF-7EC5D35BFD0B}" dt="2024-11-20T21:26:19.208" v="385" actId="164"/>
-          <ac:cxnSpMkLst>
-            <pc:docMk/>
-            <pc:sldMk cId="2274438376" sldId="256"/>
-            <ac:cxnSpMk id="10" creationId="{112CDBEF-B5CC-55C8-1B7C-260DAB8C7DBF}"/>
-          </ac:cxnSpMkLst>
-        </pc:cxnChg>
-        <pc:cxnChg chg="add mod">
-          <ac:chgData name="Gilbert, Neil" userId="37be9f5c-8f28-415b-96d6-624acf93bb3f" providerId="ADAL" clId="{545DF808-1DAB-4F9B-95AF-7EC5D35BFD0B}" dt="2024-11-20T21:26:19.208" v="385" actId="164"/>
-          <ac:cxnSpMkLst>
-            <pc:docMk/>
-            <pc:sldMk cId="2274438376" sldId="256"/>
-            <ac:cxnSpMk id="11" creationId="{DBEB8CF1-4E26-18EC-3479-E0F67F5493C5}"/>
-          </ac:cxnSpMkLst>
-        </pc:cxnChg>
-        <pc:cxnChg chg="add mod">
-          <ac:chgData name="Gilbert, Neil" userId="37be9f5c-8f28-415b-96d6-624acf93bb3f" providerId="ADAL" clId="{545DF808-1DAB-4F9B-95AF-7EC5D35BFD0B}" dt="2024-11-20T21:26:19.208" v="385" actId="164"/>
-          <ac:cxnSpMkLst>
-            <pc:docMk/>
-            <pc:sldMk cId="2274438376" sldId="256"/>
-            <ac:cxnSpMk id="12" creationId="{292FBF20-147C-0442-D244-5CE463341BAD}"/>
-          </ac:cxnSpMkLst>
-        </pc:cxnChg>
         <pc:cxnChg chg="mod">
           <ac:chgData name="Gilbert, Neil" userId="37be9f5c-8f28-415b-96d6-624acf93bb3f" providerId="ADAL" clId="{545DF808-1DAB-4F9B-95AF-7EC5D35BFD0B}" dt="2024-11-20T21:26:39.620" v="387"/>
           <ac:cxnSpMkLst>
@@ -714,30 +458,6 @@
             <ac:cxnSpMk id="38" creationId="{112CDBEF-B5CC-55C8-1B7C-260DAB8C7DBF}"/>
           </ac:cxnSpMkLst>
         </pc:cxnChg>
-        <pc:cxnChg chg="mod topLvl">
-          <ac:chgData name="Gilbert, Neil" userId="37be9f5c-8f28-415b-96d6-624acf93bb3f" providerId="ADAL" clId="{545DF808-1DAB-4F9B-95AF-7EC5D35BFD0B}" dt="2024-11-20T21:26:19.208" v="385" actId="164"/>
-          <ac:cxnSpMkLst>
-            <pc:docMk/>
-            <pc:sldMk cId="2274438376" sldId="256"/>
-            <ac:cxnSpMk id="39" creationId="{0A524109-64A2-2325-DAB9-FE4544E7083E}"/>
-          </ac:cxnSpMkLst>
-        </pc:cxnChg>
-        <pc:cxnChg chg="mod topLvl">
-          <ac:chgData name="Gilbert, Neil" userId="37be9f5c-8f28-415b-96d6-624acf93bb3f" providerId="ADAL" clId="{545DF808-1DAB-4F9B-95AF-7EC5D35BFD0B}" dt="2024-11-20T21:26:19.208" v="385" actId="164"/>
-          <ac:cxnSpMkLst>
-            <pc:docMk/>
-            <pc:sldMk cId="2274438376" sldId="256"/>
-            <ac:cxnSpMk id="41" creationId="{7298496A-F513-3746-8EEB-89A12FF3847E}"/>
-          </ac:cxnSpMkLst>
-        </pc:cxnChg>
-        <pc:cxnChg chg="mod topLvl">
-          <ac:chgData name="Gilbert, Neil" userId="37be9f5c-8f28-415b-96d6-624acf93bb3f" providerId="ADAL" clId="{545DF808-1DAB-4F9B-95AF-7EC5D35BFD0B}" dt="2024-11-20T21:26:19.208" v="385" actId="164"/>
-          <ac:cxnSpMkLst>
-            <pc:docMk/>
-            <pc:sldMk cId="2274438376" sldId="256"/>
-            <ac:cxnSpMk id="43" creationId="{5A217284-653D-DA4B-FD1C-4F11427E0D49}"/>
-          </ac:cxnSpMkLst>
-        </pc:cxnChg>
         <pc:cxnChg chg="mod">
           <ac:chgData name="Gilbert, Neil" userId="37be9f5c-8f28-415b-96d6-624acf93bb3f" providerId="ADAL" clId="{545DF808-1DAB-4F9B-95AF-7EC5D35BFD0B}" dt="2024-11-20T21:26:39.620" v="387"/>
           <ac:cxnSpMkLst>
@@ -760,78 +480,6 @@
             <pc:docMk/>
             <pc:sldMk cId="2274438376" sldId="256"/>
             <ac:cxnSpMk id="52" creationId="{0A524109-64A2-2325-DAB9-FE4544E7083E}"/>
-          </ac:cxnSpMkLst>
-        </pc:cxnChg>
-        <pc:cxnChg chg="mod topLvl">
-          <ac:chgData name="Gilbert, Neil" userId="37be9f5c-8f28-415b-96d6-624acf93bb3f" providerId="ADAL" clId="{545DF808-1DAB-4F9B-95AF-7EC5D35BFD0B}" dt="2024-11-20T21:26:19.208" v="385" actId="164"/>
-          <ac:cxnSpMkLst>
-            <pc:docMk/>
-            <pc:sldMk cId="2274438376" sldId="256"/>
-            <ac:cxnSpMk id="58" creationId="{6F5D603B-0B3E-C085-59C0-21E81CD8188A}"/>
-          </ac:cxnSpMkLst>
-        </pc:cxnChg>
-        <pc:cxnChg chg="del mod topLvl">
-          <ac:chgData name="Gilbert, Neil" userId="37be9f5c-8f28-415b-96d6-624acf93bb3f" providerId="ADAL" clId="{545DF808-1DAB-4F9B-95AF-7EC5D35BFD0B}" dt="2024-11-20T21:23:01.126" v="157" actId="478"/>
-          <ac:cxnSpMkLst>
-            <pc:docMk/>
-            <pc:sldMk cId="2274438376" sldId="256"/>
-            <ac:cxnSpMk id="59" creationId="{8073DF6A-3ADD-3CAC-7BA5-D48A8C6D65B2}"/>
-          </ac:cxnSpMkLst>
-        </pc:cxnChg>
-        <pc:cxnChg chg="del mod topLvl">
-          <ac:chgData name="Gilbert, Neil" userId="37be9f5c-8f28-415b-96d6-624acf93bb3f" providerId="ADAL" clId="{545DF808-1DAB-4F9B-95AF-7EC5D35BFD0B}" dt="2024-11-20T21:23:34.971" v="243" actId="478"/>
-          <ac:cxnSpMkLst>
-            <pc:docMk/>
-            <pc:sldMk cId="2274438376" sldId="256"/>
-            <ac:cxnSpMk id="60" creationId="{95481D7F-9AB0-1D9E-3491-8BB2AC804985}"/>
-          </ac:cxnSpMkLst>
-        </pc:cxnChg>
-        <pc:cxnChg chg="del mod topLvl">
-          <ac:chgData name="Gilbert, Neil" userId="37be9f5c-8f28-415b-96d6-624acf93bb3f" providerId="ADAL" clId="{545DF808-1DAB-4F9B-95AF-7EC5D35BFD0B}" dt="2024-11-20T21:23:57.788" v="358" actId="478"/>
-          <ac:cxnSpMkLst>
-            <pc:docMk/>
-            <pc:sldMk cId="2274438376" sldId="256"/>
-            <ac:cxnSpMk id="61" creationId="{76BD7A7E-3E3F-BDED-8173-6E7A96771EAB}"/>
-          </ac:cxnSpMkLst>
-        </pc:cxnChg>
-        <pc:cxnChg chg="mod">
-          <ac:chgData name="Gilbert, Neil" userId="37be9f5c-8f28-415b-96d6-624acf93bb3f" providerId="ADAL" clId="{545DF808-1DAB-4F9B-95AF-7EC5D35BFD0B}" dt="2024-11-07T16:52:50.854" v="7" actId="165"/>
-          <ac:cxnSpMkLst>
-            <pc:docMk/>
-            <pc:sldMk cId="2274438376" sldId="256"/>
-            <ac:cxnSpMk id="65" creationId="{843ACF6E-7305-40F1-596A-1B0D2B153F97}"/>
-          </ac:cxnSpMkLst>
-        </pc:cxnChg>
-        <pc:cxnChg chg="mod">
-          <ac:chgData name="Gilbert, Neil" userId="37be9f5c-8f28-415b-96d6-624acf93bb3f" providerId="ADAL" clId="{545DF808-1DAB-4F9B-95AF-7EC5D35BFD0B}" dt="2024-11-07T16:52:50.854" v="7" actId="165"/>
-          <ac:cxnSpMkLst>
-            <pc:docMk/>
-            <pc:sldMk cId="2274438376" sldId="256"/>
-            <ac:cxnSpMk id="68" creationId="{647BC4FB-6118-925C-BD58-63D01493DE54}"/>
-          </ac:cxnSpMkLst>
-        </pc:cxnChg>
-        <pc:cxnChg chg="mod">
-          <ac:chgData name="Gilbert, Neil" userId="37be9f5c-8f28-415b-96d6-624acf93bb3f" providerId="ADAL" clId="{545DF808-1DAB-4F9B-95AF-7EC5D35BFD0B}" dt="2024-11-07T16:52:50.854" v="7" actId="165"/>
-          <ac:cxnSpMkLst>
-            <pc:docMk/>
-            <pc:sldMk cId="2274438376" sldId="256"/>
-            <ac:cxnSpMk id="69" creationId="{CC2D9442-039B-3FE0-4D4C-BF897A051003}"/>
-          </ac:cxnSpMkLst>
-        </pc:cxnChg>
-        <pc:cxnChg chg="mod">
-          <ac:chgData name="Gilbert, Neil" userId="37be9f5c-8f28-415b-96d6-624acf93bb3f" providerId="ADAL" clId="{545DF808-1DAB-4F9B-95AF-7EC5D35BFD0B}" dt="2024-11-07T16:54:31.540" v="9"/>
-          <ac:cxnSpMkLst>
-            <pc:docMk/>
-            <pc:sldMk cId="2274438376" sldId="256"/>
-            <ac:cxnSpMk id="73" creationId="{0A524109-64A2-2325-DAB9-FE4544E7083E}"/>
-          </ac:cxnSpMkLst>
-        </pc:cxnChg>
-        <pc:cxnChg chg="mod">
-          <ac:chgData name="Gilbert, Neil" userId="37be9f5c-8f28-415b-96d6-624acf93bb3f" providerId="ADAL" clId="{545DF808-1DAB-4F9B-95AF-7EC5D35BFD0B}" dt="2024-11-07T16:54:31.540" v="9"/>
-          <ac:cxnSpMkLst>
-            <pc:docMk/>
-            <pc:sldMk cId="2274438376" sldId="256"/>
-            <ac:cxnSpMk id="77" creationId="{843ACF6E-7305-40F1-596A-1B0D2B153F97}"/>
           </ac:cxnSpMkLst>
         </pc:cxnChg>
         <pc:cxnChg chg="mod">
@@ -1003,7 +651,7 @@
           <a:p>
             <a:fld id="{0060E5B6-8B05-4C07-AEFE-0C95C3CF4001}" type="datetimeFigureOut">
               <a:rPr lang="en-US" smtClean="0"/>
-              <a:t>11/19/2024</a:t>
+              <a:t>12/9/2024</a:t>
             </a:fld>
             <a:endParaRPr lang="en-US"/>
           </a:p>
@@ -1173,7 +821,7 @@
           <a:p>
             <a:fld id="{0060E5B6-8B05-4C07-AEFE-0C95C3CF4001}" type="datetimeFigureOut">
               <a:rPr lang="en-US" smtClean="0"/>
-              <a:t>11/19/2024</a:t>
+              <a:t>12/9/2024</a:t>
             </a:fld>
             <a:endParaRPr lang="en-US"/>
           </a:p>
@@ -1353,7 +1001,7 @@
           <a:p>
             <a:fld id="{0060E5B6-8B05-4C07-AEFE-0C95C3CF4001}" type="datetimeFigureOut">
               <a:rPr lang="en-US" smtClean="0"/>
-              <a:t>11/19/2024</a:t>
+              <a:t>12/9/2024</a:t>
             </a:fld>
             <a:endParaRPr lang="en-US"/>
           </a:p>
@@ -1523,7 +1171,7 @@
           <a:p>
             <a:fld id="{0060E5B6-8B05-4C07-AEFE-0C95C3CF4001}" type="datetimeFigureOut">
               <a:rPr lang="en-US" smtClean="0"/>
-              <a:t>11/19/2024</a:t>
+              <a:t>12/9/2024</a:t>
             </a:fld>
             <a:endParaRPr lang="en-US"/>
           </a:p>
@@ -1769,7 +1417,7 @@
           <a:p>
             <a:fld id="{0060E5B6-8B05-4C07-AEFE-0C95C3CF4001}" type="datetimeFigureOut">
               <a:rPr lang="en-US" smtClean="0"/>
-              <a:t>11/19/2024</a:t>
+              <a:t>12/9/2024</a:t>
             </a:fld>
             <a:endParaRPr lang="en-US"/>
           </a:p>
@@ -2001,7 +1649,7 @@
           <a:p>
             <a:fld id="{0060E5B6-8B05-4C07-AEFE-0C95C3CF4001}" type="datetimeFigureOut">
               <a:rPr lang="en-US" smtClean="0"/>
-              <a:t>11/19/2024</a:t>
+              <a:t>12/9/2024</a:t>
             </a:fld>
             <a:endParaRPr lang="en-US"/>
           </a:p>
@@ -2368,7 +2016,7 @@
           <a:p>
             <a:fld id="{0060E5B6-8B05-4C07-AEFE-0C95C3CF4001}" type="datetimeFigureOut">
               <a:rPr lang="en-US" smtClean="0"/>
-              <a:t>11/19/2024</a:t>
+              <a:t>12/9/2024</a:t>
             </a:fld>
             <a:endParaRPr lang="en-US"/>
           </a:p>
@@ -2486,7 +2134,7 @@
           <a:p>
             <a:fld id="{0060E5B6-8B05-4C07-AEFE-0C95C3CF4001}" type="datetimeFigureOut">
               <a:rPr lang="en-US" smtClean="0"/>
-              <a:t>11/19/2024</a:t>
+              <a:t>12/9/2024</a:t>
             </a:fld>
             <a:endParaRPr lang="en-US"/>
           </a:p>
@@ -2581,7 +2229,7 @@
           <a:p>
             <a:fld id="{0060E5B6-8B05-4C07-AEFE-0C95C3CF4001}" type="datetimeFigureOut">
               <a:rPr lang="en-US" smtClean="0"/>
-              <a:t>11/19/2024</a:t>
+              <a:t>12/9/2024</a:t>
             </a:fld>
             <a:endParaRPr lang="en-US"/>
           </a:p>
@@ -2858,7 +2506,7 @@
           <a:p>
             <a:fld id="{0060E5B6-8B05-4C07-AEFE-0C95C3CF4001}" type="datetimeFigureOut">
               <a:rPr lang="en-US" smtClean="0"/>
-              <a:t>11/19/2024</a:t>
+              <a:t>12/9/2024</a:t>
             </a:fld>
             <a:endParaRPr lang="en-US"/>
           </a:p>
@@ -3115,7 +2763,7 @@
           <a:p>
             <a:fld id="{0060E5B6-8B05-4C07-AEFE-0C95C3CF4001}" type="datetimeFigureOut">
               <a:rPr lang="en-US" smtClean="0"/>
-              <a:t>11/19/2024</a:t>
+              <a:t>12/9/2024</a:t>
             </a:fld>
             <a:endParaRPr lang="en-US"/>
           </a:p>
@@ -3328,7 +2976,7 @@
           <a:p>
             <a:fld id="{0060E5B6-8B05-4C07-AEFE-0C95C3CF4001}" type="datetimeFigureOut">
               <a:rPr lang="en-US" smtClean="0"/>
-              <a:t>11/19/2024</a:t>
+              <a:t>12/9/2024</a:t>
             </a:fld>
             <a:endParaRPr lang="en-US"/>
           </a:p>
@@ -4722,10 +4370,9 @@
                   <a:solidFill>
                     <a:schemeClr val="tx1"/>
                   </a:solidFill>
-                  <a:latin typeface="Arial" panose="020B0604020202020204" pitchFamily="34" charset="0"/>
                   <a:cs typeface="Arial" panose="020B0604020202020204" pitchFamily="34" charset="0"/>
                 </a:rPr>
-                <a:t>(a)</a:t>
+                <a:t>(A)</a:t>
               </a:r>
             </a:p>
           </p:txBody>
@@ -4781,10 +4428,9 @@
                   <a:solidFill>
                     <a:schemeClr val="tx1"/>
                   </a:solidFill>
-                  <a:latin typeface="Arial" panose="020B0604020202020204" pitchFamily="34" charset="0"/>
                   <a:cs typeface="Arial" panose="020B0604020202020204" pitchFamily="34" charset="0"/>
                 </a:rPr>
-                <a:t>(b)</a:t>
+                <a:t>(B)</a:t>
               </a:r>
             </a:p>
           </p:txBody>
@@ -4840,10 +4486,9 @@
                   <a:solidFill>
                     <a:schemeClr val="tx1"/>
                   </a:solidFill>
-                  <a:latin typeface="Arial" panose="020B0604020202020204" pitchFamily="34" charset="0"/>
                   <a:cs typeface="Arial" panose="020B0604020202020204" pitchFamily="34" charset="0"/>
                 </a:rPr>
-                <a:t>(c)</a:t>
+                <a:t>(C)</a:t>
               </a:r>
             </a:p>
           </p:txBody>
@@ -4899,10 +4544,9 @@
                   <a:solidFill>
                     <a:schemeClr val="tx1"/>
                   </a:solidFill>
-                  <a:latin typeface="Arial" panose="020B0604020202020204" pitchFamily="34" charset="0"/>
                   <a:cs typeface="Arial" panose="020B0604020202020204" pitchFamily="34" charset="0"/>
                 </a:rPr>
-                <a:t>(d)</a:t>
+                <a:t>(D)</a:t>
               </a:r>
             </a:p>
           </p:txBody>
@@ -4958,10 +4602,9 @@
                   <a:solidFill>
                     <a:schemeClr val="tx1"/>
                   </a:solidFill>
-                  <a:latin typeface="Arial" panose="020B0604020202020204" pitchFamily="34" charset="0"/>
                   <a:cs typeface="Arial" panose="020B0604020202020204" pitchFamily="34" charset="0"/>
                 </a:rPr>
-                <a:t>(e)</a:t>
+                <a:t>(E)</a:t>
               </a:r>
             </a:p>
           </p:txBody>

</xml_diff>

<commit_message>
whoops forgot x-axis title for b-e panels
</commit_message>
<xml_diff>
--- a/Results/Figures/figure_04.pptx
+++ b/Results/Figures/figure_04.pptx
@@ -123,23 +123,31 @@
 </p:presentation>
 </file>
 
+<file path=ppt/revisionInfo.xml><?xml version="1.0" encoding="utf-8"?>
+<p1510:revInfo xmlns:a="http://schemas.openxmlformats.org/drawingml/2006/main" xmlns:r="http://schemas.openxmlformats.org/officeDocument/2006/relationships" xmlns:p1510="http://schemas.microsoft.com/office/powerpoint/2015/10/main">
+  <p1510:revLst>
+    <p1510:client id="{58ECA877-5A44-417D-9F70-19BA7C32A50C}" v="1" dt="2024-12-12T16:15:09.990"/>
+  </p1510:revLst>
+</p1510:revInfo>
+</file>
+
 <file path=ppt/changesInfos/changesInfo1.xml><?xml version="1.0" encoding="utf-8"?>
 <pc:chgInfo xmlns:a="http://schemas.openxmlformats.org/drawingml/2006/main" xmlns:r="http://schemas.openxmlformats.org/officeDocument/2006/relationships" xmlns:ac="http://schemas.microsoft.com/office/drawing/2013/main/command" xmlns:pc="http://schemas.microsoft.com/office/powerpoint/2013/main/command">
   <pc:docChgLst>
     <pc:chgData name="Gilbert, Neil" userId="37be9f5c-8f28-415b-96d6-624acf93bb3f" providerId="ADAL" clId="{58ECA877-5A44-417D-9F70-19BA7C32A50C}"/>
     <pc:docChg chg="undo custSel modSld">
-      <pc:chgData name="Gilbert, Neil" userId="37be9f5c-8f28-415b-96d6-624acf93bb3f" providerId="ADAL" clId="{58ECA877-5A44-417D-9F70-19BA7C32A50C}" dt="2024-12-09T18:08:21.259" v="17" actId="2711"/>
+      <pc:chgData name="Gilbert, Neil" userId="37be9f5c-8f28-415b-96d6-624acf93bb3f" providerId="ADAL" clId="{58ECA877-5A44-417D-9F70-19BA7C32A50C}" dt="2024-12-12T16:18:38.725" v="147" actId="1035"/>
       <pc:docMkLst>
         <pc:docMk/>
       </pc:docMkLst>
-      <pc:sldChg chg="modSp mod">
-        <pc:chgData name="Gilbert, Neil" userId="37be9f5c-8f28-415b-96d6-624acf93bb3f" providerId="ADAL" clId="{58ECA877-5A44-417D-9F70-19BA7C32A50C}" dt="2024-12-09T18:08:21.259" v="17" actId="2711"/>
+      <pc:sldChg chg="addSp delSp modSp mod">
+        <pc:chgData name="Gilbert, Neil" userId="37be9f5c-8f28-415b-96d6-624acf93bb3f" providerId="ADAL" clId="{58ECA877-5A44-417D-9F70-19BA7C32A50C}" dt="2024-12-12T16:18:38.725" v="147" actId="1035"/>
         <pc:sldMkLst>
           <pc:docMk/>
           <pc:sldMk cId="2274438376" sldId="256"/>
         </pc:sldMkLst>
         <pc:spChg chg="mod">
-          <ac:chgData name="Gilbert, Neil" userId="37be9f5c-8f28-415b-96d6-624acf93bb3f" providerId="ADAL" clId="{58ECA877-5A44-417D-9F70-19BA7C32A50C}" dt="2024-12-09T18:07:36.626" v="4" actId="2711"/>
+          <ac:chgData name="Gilbert, Neil" userId="37be9f5c-8f28-415b-96d6-624acf93bb3f" providerId="ADAL" clId="{58ECA877-5A44-417D-9F70-19BA7C32A50C}" dt="2024-12-12T16:17:59.711" v="123" actId="2711"/>
           <ac:spMkLst>
             <pc:docMk/>
             <pc:sldMk cId="2274438376" sldId="256"/>
@@ -147,7 +155,7 @@
           </ac:spMkLst>
         </pc:spChg>
         <pc:spChg chg="mod">
-          <ac:chgData name="Gilbert, Neil" userId="37be9f5c-8f28-415b-96d6-624acf93bb3f" providerId="ADAL" clId="{58ECA877-5A44-417D-9F70-19BA7C32A50C}" dt="2024-12-09T18:07:49.421" v="7" actId="2711"/>
+          <ac:chgData name="Gilbert, Neil" userId="37be9f5c-8f28-415b-96d6-624acf93bb3f" providerId="ADAL" clId="{58ECA877-5A44-417D-9F70-19BA7C32A50C}" dt="2024-12-12T16:18:05.142" v="124" actId="2711"/>
           <ac:spMkLst>
             <pc:docMk/>
             <pc:sldMk cId="2274438376" sldId="256"/>
@@ -155,7 +163,7 @@
           </ac:spMkLst>
         </pc:spChg>
         <pc:spChg chg="mod">
-          <ac:chgData name="Gilbert, Neil" userId="37be9f5c-8f28-415b-96d6-624acf93bb3f" providerId="ADAL" clId="{58ECA877-5A44-417D-9F70-19BA7C32A50C}" dt="2024-12-09T18:08:00.085" v="9" actId="2711"/>
+          <ac:chgData name="Gilbert, Neil" userId="37be9f5c-8f28-415b-96d6-624acf93bb3f" providerId="ADAL" clId="{58ECA877-5A44-417D-9F70-19BA7C32A50C}" dt="2024-12-12T16:18:24.692" v="129" actId="1035"/>
           <ac:spMkLst>
             <pc:docMk/>
             <pc:sldMk cId="2274438376" sldId="256"/>
@@ -163,7 +171,7 @@
           </ac:spMkLst>
         </pc:spChg>
         <pc:spChg chg="mod">
-          <ac:chgData name="Gilbert, Neil" userId="37be9f5c-8f28-415b-96d6-624acf93bb3f" providerId="ADAL" clId="{58ECA877-5A44-417D-9F70-19BA7C32A50C}" dt="2024-12-09T18:08:11.391" v="12" actId="2711"/>
+          <ac:chgData name="Gilbert, Neil" userId="37be9f5c-8f28-415b-96d6-624acf93bb3f" providerId="ADAL" clId="{58ECA877-5A44-417D-9F70-19BA7C32A50C}" dt="2024-12-12T16:18:29.945" v="135" actId="1035"/>
           <ac:spMkLst>
             <pc:docMk/>
             <pc:sldMk cId="2274438376" sldId="256"/>
@@ -171,13 +179,93 @@
           </ac:spMkLst>
         </pc:spChg>
         <pc:spChg chg="mod">
-          <ac:chgData name="Gilbert, Neil" userId="37be9f5c-8f28-415b-96d6-624acf93bb3f" providerId="ADAL" clId="{58ECA877-5A44-417D-9F70-19BA7C32A50C}" dt="2024-12-09T18:08:21.259" v="17" actId="2711"/>
+          <ac:chgData name="Gilbert, Neil" userId="37be9f5c-8f28-415b-96d6-624acf93bb3f" providerId="ADAL" clId="{58ECA877-5A44-417D-9F70-19BA7C32A50C}" dt="2024-12-12T16:18:38.725" v="147" actId="1035"/>
           <ac:spMkLst>
             <pc:docMk/>
             <pc:sldMk cId="2274438376" sldId="256"/>
             <ac:spMk id="30" creationId="{F03526F6-5615-6765-4FB9-9F92C5EA44C4}"/>
           </ac:spMkLst>
         </pc:spChg>
+        <pc:picChg chg="add mod ord">
+          <ac:chgData name="Gilbert, Neil" userId="37be9f5c-8f28-415b-96d6-624acf93bb3f" providerId="ADAL" clId="{58ECA877-5A44-417D-9F70-19BA7C32A50C}" dt="2024-12-12T16:15:24.939" v="24" actId="1076"/>
+          <ac:picMkLst>
+            <pc:docMk/>
+            <pc:sldMk cId="2274438376" sldId="256"/>
+            <ac:picMk id="3" creationId="{C7B2A065-A284-FC33-C5B1-BBE525EAF86A}"/>
+          </ac:picMkLst>
+        </pc:picChg>
+        <pc:picChg chg="del">
+          <ac:chgData name="Gilbert, Neil" userId="37be9f5c-8f28-415b-96d6-624acf93bb3f" providerId="ADAL" clId="{58ECA877-5A44-417D-9F70-19BA7C32A50C}" dt="2024-12-12T16:15:05.209" v="18" actId="478"/>
+          <ac:picMkLst>
+            <pc:docMk/>
+            <pc:sldMk cId="2274438376" sldId="256"/>
+            <ac:picMk id="15" creationId="{F041AB7B-E01E-E762-5A3B-0D6EACCF47DD}"/>
+          </ac:picMkLst>
+        </pc:picChg>
+        <pc:cxnChg chg="mod">
+          <ac:chgData name="Gilbert, Neil" userId="37be9f5c-8f28-415b-96d6-624acf93bb3f" providerId="ADAL" clId="{58ECA877-5A44-417D-9F70-19BA7C32A50C}" dt="2024-12-12T16:15:44.729" v="42" actId="1037"/>
+          <ac:cxnSpMkLst>
+            <pc:docMk/>
+            <pc:sldMk cId="2274438376" sldId="256"/>
+            <ac:cxnSpMk id="25" creationId="{6F5D603B-0B3E-C085-59C0-21E81CD8188A}"/>
+          </ac:cxnSpMkLst>
+        </pc:cxnChg>
+        <pc:cxnChg chg="mod">
+          <ac:chgData name="Gilbert, Neil" userId="37be9f5c-8f28-415b-96d6-624acf93bb3f" providerId="ADAL" clId="{58ECA877-5A44-417D-9F70-19BA7C32A50C}" dt="2024-12-12T16:16:53.551" v="54" actId="1076"/>
+          <ac:cxnSpMkLst>
+            <pc:docMk/>
+            <pc:sldMk cId="2274438376" sldId="256"/>
+            <ac:cxnSpMk id="32" creationId="{76478CF5-D66A-864E-0545-754861328290}"/>
+          </ac:cxnSpMkLst>
+        </pc:cxnChg>
+        <pc:cxnChg chg="mod">
+          <ac:chgData name="Gilbert, Neil" userId="37be9f5c-8f28-415b-96d6-624acf93bb3f" providerId="ADAL" clId="{58ECA877-5A44-417D-9F70-19BA7C32A50C}" dt="2024-12-12T16:17:25.261" v="84" actId="1035"/>
+          <ac:cxnSpMkLst>
+            <pc:docMk/>
+            <pc:sldMk cId="2274438376" sldId="256"/>
+            <ac:cxnSpMk id="33" creationId="{98AF517D-BDB0-D667-6E8B-44196B779148}"/>
+          </ac:cxnSpMkLst>
+        </pc:cxnChg>
+        <pc:cxnChg chg="mod">
+          <ac:chgData name="Gilbert, Neil" userId="37be9f5c-8f28-415b-96d6-624acf93bb3f" providerId="ADAL" clId="{58ECA877-5A44-417D-9F70-19BA7C32A50C}" dt="2024-12-12T16:17:25.261" v="84" actId="1035"/>
+          <ac:cxnSpMkLst>
+            <pc:docMk/>
+            <pc:sldMk cId="2274438376" sldId="256"/>
+            <ac:cxnSpMk id="34" creationId="{67FC8DFA-9CAD-C6C3-F9B7-A30ABF8F7ADB}"/>
+          </ac:cxnSpMkLst>
+        </pc:cxnChg>
+        <pc:cxnChg chg="mod">
+          <ac:chgData name="Gilbert, Neil" userId="37be9f5c-8f28-415b-96d6-624acf93bb3f" providerId="ADAL" clId="{58ECA877-5A44-417D-9F70-19BA7C32A50C}" dt="2024-12-12T16:17:35.901" v="101" actId="1035"/>
+          <ac:cxnSpMkLst>
+            <pc:docMk/>
+            <pc:sldMk cId="2274438376" sldId="256"/>
+            <ac:cxnSpMk id="36" creationId="{AC65409D-2EEC-F363-E75B-3AAB3BE7C2C3}"/>
+          </ac:cxnSpMkLst>
+        </pc:cxnChg>
+        <pc:cxnChg chg="mod">
+          <ac:chgData name="Gilbert, Neil" userId="37be9f5c-8f28-415b-96d6-624acf93bb3f" providerId="ADAL" clId="{58ECA877-5A44-417D-9F70-19BA7C32A50C}" dt="2024-12-12T16:17:35.901" v="101" actId="1035"/>
+          <ac:cxnSpMkLst>
+            <pc:docMk/>
+            <pc:sldMk cId="2274438376" sldId="256"/>
+            <ac:cxnSpMk id="38" creationId="{112CDBEF-B5CC-55C8-1B7C-260DAB8C7DBF}"/>
+          </ac:cxnSpMkLst>
+        </pc:cxnChg>
+        <pc:cxnChg chg="mod">
+          <ac:chgData name="Gilbert, Neil" userId="37be9f5c-8f28-415b-96d6-624acf93bb3f" providerId="ADAL" clId="{58ECA877-5A44-417D-9F70-19BA7C32A50C}" dt="2024-12-12T16:17:48.737" v="122" actId="1035"/>
+          <ac:cxnSpMkLst>
+            <pc:docMk/>
+            <pc:sldMk cId="2274438376" sldId="256"/>
+            <ac:cxnSpMk id="44" creationId="{DBEB8CF1-4E26-18EC-3479-E0F67F5493C5}"/>
+          </ac:cxnSpMkLst>
+        </pc:cxnChg>
+        <pc:cxnChg chg="mod">
+          <ac:chgData name="Gilbert, Neil" userId="37be9f5c-8f28-415b-96d6-624acf93bb3f" providerId="ADAL" clId="{58ECA877-5A44-417D-9F70-19BA7C32A50C}" dt="2024-12-12T16:17:48.737" v="122" actId="1035"/>
+          <ac:cxnSpMkLst>
+            <pc:docMk/>
+            <pc:sldMk cId="2274438376" sldId="256"/>
+            <ac:cxnSpMk id="46" creationId="{292FBF20-147C-0442-D244-5CE463341BAD}"/>
+          </ac:cxnSpMkLst>
+        </pc:cxnChg>
       </pc:sldChg>
     </pc:docChg>
   </pc:docChgLst>
@@ -375,14 +463,6 @@
           <ac:picMkLst>
             <pc:docMk/>
             <pc:sldMk cId="2274438376" sldId="256"/>
-            <ac:picMk id="15" creationId="{F041AB7B-E01E-E762-5A3B-0D6EACCF47DD}"/>
-          </ac:picMkLst>
-        </pc:picChg>
-        <pc:picChg chg="mod">
-          <ac:chgData name="Gilbert, Neil" userId="37be9f5c-8f28-415b-96d6-624acf93bb3f" providerId="ADAL" clId="{545DF808-1DAB-4F9B-95AF-7EC5D35BFD0B}" dt="2024-11-20T21:26:39.620" v="387"/>
-          <ac:picMkLst>
-            <pc:docMk/>
-            <pc:sldMk cId="2274438376" sldId="256"/>
             <ac:picMk id="16" creationId="{CA051D8C-76F8-3D6B-6ABA-A299280F8CB7}"/>
           </ac:picMkLst>
         </pc:picChg>
@@ -651,7 +731,7 @@
           <a:p>
             <a:fld id="{0060E5B6-8B05-4C07-AEFE-0C95C3CF4001}" type="datetimeFigureOut">
               <a:rPr lang="en-US" smtClean="0"/>
-              <a:t>12/9/2024</a:t>
+              <a:t>12/12/2024</a:t>
             </a:fld>
             <a:endParaRPr lang="en-US"/>
           </a:p>
@@ -821,7 +901,7 @@
           <a:p>
             <a:fld id="{0060E5B6-8B05-4C07-AEFE-0C95C3CF4001}" type="datetimeFigureOut">
               <a:rPr lang="en-US" smtClean="0"/>
-              <a:t>12/9/2024</a:t>
+              <a:t>12/12/2024</a:t>
             </a:fld>
             <a:endParaRPr lang="en-US"/>
           </a:p>
@@ -1001,7 +1081,7 @@
           <a:p>
             <a:fld id="{0060E5B6-8B05-4C07-AEFE-0C95C3CF4001}" type="datetimeFigureOut">
               <a:rPr lang="en-US" smtClean="0"/>
-              <a:t>12/9/2024</a:t>
+              <a:t>12/12/2024</a:t>
             </a:fld>
             <a:endParaRPr lang="en-US"/>
           </a:p>
@@ -1171,7 +1251,7 @@
           <a:p>
             <a:fld id="{0060E5B6-8B05-4C07-AEFE-0C95C3CF4001}" type="datetimeFigureOut">
               <a:rPr lang="en-US" smtClean="0"/>
-              <a:t>12/9/2024</a:t>
+              <a:t>12/12/2024</a:t>
             </a:fld>
             <a:endParaRPr lang="en-US"/>
           </a:p>
@@ -1417,7 +1497,7 @@
           <a:p>
             <a:fld id="{0060E5B6-8B05-4C07-AEFE-0C95C3CF4001}" type="datetimeFigureOut">
               <a:rPr lang="en-US" smtClean="0"/>
-              <a:t>12/9/2024</a:t>
+              <a:t>12/12/2024</a:t>
             </a:fld>
             <a:endParaRPr lang="en-US"/>
           </a:p>
@@ -1649,7 +1729,7 @@
           <a:p>
             <a:fld id="{0060E5B6-8B05-4C07-AEFE-0C95C3CF4001}" type="datetimeFigureOut">
               <a:rPr lang="en-US" smtClean="0"/>
-              <a:t>12/9/2024</a:t>
+              <a:t>12/12/2024</a:t>
             </a:fld>
             <a:endParaRPr lang="en-US"/>
           </a:p>
@@ -2016,7 +2096,7 @@
           <a:p>
             <a:fld id="{0060E5B6-8B05-4C07-AEFE-0C95C3CF4001}" type="datetimeFigureOut">
               <a:rPr lang="en-US" smtClean="0"/>
-              <a:t>12/9/2024</a:t>
+              <a:t>12/12/2024</a:t>
             </a:fld>
             <a:endParaRPr lang="en-US"/>
           </a:p>
@@ -2134,7 +2214,7 @@
           <a:p>
             <a:fld id="{0060E5B6-8B05-4C07-AEFE-0C95C3CF4001}" type="datetimeFigureOut">
               <a:rPr lang="en-US" smtClean="0"/>
-              <a:t>12/9/2024</a:t>
+              <a:t>12/12/2024</a:t>
             </a:fld>
             <a:endParaRPr lang="en-US"/>
           </a:p>
@@ -2229,7 +2309,7 @@
           <a:p>
             <a:fld id="{0060E5B6-8B05-4C07-AEFE-0C95C3CF4001}" type="datetimeFigureOut">
               <a:rPr lang="en-US" smtClean="0"/>
-              <a:t>12/9/2024</a:t>
+              <a:t>12/12/2024</a:t>
             </a:fld>
             <a:endParaRPr lang="en-US"/>
           </a:p>
@@ -2506,7 +2586,7 @@
           <a:p>
             <a:fld id="{0060E5B6-8B05-4C07-AEFE-0C95C3CF4001}" type="datetimeFigureOut">
               <a:rPr lang="en-US" smtClean="0"/>
-              <a:t>12/9/2024</a:t>
+              <a:t>12/12/2024</a:t>
             </a:fld>
             <a:endParaRPr lang="en-US"/>
           </a:p>
@@ -2763,7 +2843,7 @@
           <a:p>
             <a:fld id="{0060E5B6-8B05-4C07-AEFE-0C95C3CF4001}" type="datetimeFigureOut">
               <a:rPr lang="en-US" smtClean="0"/>
-              <a:t>12/9/2024</a:t>
+              <a:t>12/12/2024</a:t>
             </a:fld>
             <a:endParaRPr lang="en-US"/>
           </a:p>
@@ -2976,7 +3056,7 @@
           <a:p>
             <a:fld id="{0060E5B6-8B05-4C07-AEFE-0C95C3CF4001}" type="datetimeFigureOut">
               <a:rPr lang="en-US" smtClean="0"/>
-              <a:t>12/9/2024</a:t>
+              <a:t>12/12/2024</a:t>
             </a:fld>
             <a:endParaRPr lang="en-US"/>
           </a:p>
@@ -3381,6 +3461,42 @@
           <a:chExt cx="0" cy="0"/>
         </a:xfrm>
       </p:grpSpPr>
+      <p:pic>
+        <p:nvPicPr>
+          <p:cNvPr id="3" name="Picture 2" descr="A graph of different colored lines&#10;&#10;Description automatically generated with medium confidence">
+            <a:extLst>
+              <a:ext uri="{FF2B5EF4-FFF2-40B4-BE49-F238E27FC236}">
+                <a16:creationId xmlns:a16="http://schemas.microsoft.com/office/drawing/2014/main" id="{C7B2A065-A284-FC33-C5B1-BBE525EAF86A}"/>
+              </a:ext>
+            </a:extLst>
+          </p:cNvPr>
+          <p:cNvPicPr>
+            <a:picLocks noChangeAspect="1"/>
+          </p:cNvPicPr>
+          <p:nvPr/>
+        </p:nvPicPr>
+        <p:blipFill>
+          <a:blip r:embed="rId2">
+            <a:extLst>
+              <a:ext uri="{28A0092B-C50C-407E-A947-70E740481C1C}">
+                <a14:useLocalDpi xmlns:a14="http://schemas.microsoft.com/office/drawing/2010/main" val="0"/>
+              </a:ext>
+            </a:extLst>
+          </a:blip>
+          <a:stretch>
+            <a:fillRect/>
+          </a:stretch>
+        </p:blipFill>
+        <p:spPr>
+          <a:xfrm>
+            <a:off x="3777311" y="0"/>
+            <a:ext cx="2743068" cy="6583363"/>
+          </a:xfrm>
+          <a:prstGeom prst="rect">
+            <a:avLst/>
+          </a:prstGeom>
+        </p:spPr>
+      </p:pic>
       <p:grpSp>
         <p:nvGrpSpPr>
           <p:cNvPr id="14" name="Group 13">
@@ -3396,47 +3512,11 @@
         <p:grpSpPr>
           <a:xfrm>
             <a:off x="0" y="-1"/>
-            <a:ext cx="6545231" cy="6584761"/>
+            <a:ext cx="6413495" cy="6584761"/>
             <a:chOff x="45720" y="-1"/>
-            <a:chExt cx="6545231" cy="6584761"/>
+            <a:chExt cx="6413495" cy="6584761"/>
           </a:xfrm>
         </p:grpSpPr>
-        <p:pic>
-          <p:nvPicPr>
-            <p:cNvPr id="15" name="Picture 14" descr="A graph of different colored lines&#10;&#10;Description automatically generated with medium confidence">
-              <a:extLst>
-                <a:ext uri="{FF2B5EF4-FFF2-40B4-BE49-F238E27FC236}">
-                  <a16:creationId xmlns:a16="http://schemas.microsoft.com/office/drawing/2014/main" id="{F041AB7B-E01E-E762-5A3B-0D6EACCF47DD}"/>
-                </a:ext>
-              </a:extLst>
-            </p:cNvPr>
-            <p:cNvPicPr>
-              <a:picLocks noChangeAspect="1"/>
-            </p:cNvPicPr>
-            <p:nvPr/>
-          </p:nvPicPr>
-          <p:blipFill>
-            <a:blip r:embed="rId2">
-              <a:extLst>
-                <a:ext uri="{28A0092B-C50C-407E-A947-70E740481C1C}">
-                  <a14:useLocalDpi xmlns:a14="http://schemas.microsoft.com/office/drawing/2010/main" val="0"/>
-                </a:ext>
-              </a:extLst>
-            </a:blip>
-            <a:stretch>
-              <a:fillRect/>
-            </a:stretch>
-          </p:blipFill>
-          <p:spPr>
-            <a:xfrm>
-              <a:off x="3847883" y="793"/>
-              <a:ext cx="2743068" cy="6583363"/>
-            </a:xfrm>
-            <a:prstGeom prst="rect">
-              <a:avLst/>
-            </a:prstGeom>
-          </p:spPr>
-        </p:pic>
         <p:pic>
           <p:nvPicPr>
             <p:cNvPr id="16" name="Picture 15" descr="A diagram of a number of data&#10;&#10;Description automatically generated with medium confidence">
@@ -4280,7 +4360,7 @@
           </p:nvCxnSpPr>
           <p:spPr>
             <a:xfrm>
-              <a:off x="4239839" y="1363796"/>
+              <a:off x="4216024" y="1301877"/>
               <a:ext cx="981959" cy="0"/>
             </a:xfrm>
             <a:prstGeom prst="straightConnector1">
@@ -4370,6 +4450,7 @@
                   <a:solidFill>
                     <a:schemeClr val="tx1"/>
                   </a:solidFill>
+                  <a:latin typeface="Arial" panose="020B0604020202020204" pitchFamily="34" charset="0"/>
                   <a:cs typeface="Arial" panose="020B0604020202020204" pitchFamily="34" charset="0"/>
                 </a:rPr>
                 <a:t>(A)</a:t>
@@ -4428,6 +4509,7 @@
                   <a:solidFill>
                     <a:schemeClr val="tx1"/>
                   </a:solidFill>
+                  <a:latin typeface="Arial" panose="020B0604020202020204" pitchFamily="34" charset="0"/>
                   <a:cs typeface="Arial" panose="020B0604020202020204" pitchFamily="34" charset="0"/>
                 </a:rPr>
                 <a:t>(B)</a:t>
@@ -4449,7 +4531,7 @@
           </p:nvSpPr>
           <p:spPr>
             <a:xfrm>
-              <a:off x="3941613" y="1672756"/>
+              <a:off x="3941613" y="1657516"/>
               <a:ext cx="455804" cy="216838"/>
             </a:xfrm>
             <a:prstGeom prst="rect">
@@ -4486,6 +4568,7 @@
                   <a:solidFill>
                     <a:schemeClr val="tx1"/>
                   </a:solidFill>
+                  <a:latin typeface="Arial" panose="020B0604020202020204" pitchFamily="34" charset="0"/>
                   <a:cs typeface="Arial" panose="020B0604020202020204" pitchFamily="34" charset="0"/>
                 </a:rPr>
                 <a:t>(C)</a:t>
@@ -4507,7 +4590,7 @@
           </p:nvSpPr>
           <p:spPr>
             <a:xfrm>
-              <a:off x="3967167" y="3191247"/>
+              <a:off x="3967167" y="3145527"/>
               <a:ext cx="455804" cy="216838"/>
             </a:xfrm>
             <a:prstGeom prst="rect">
@@ -4544,6 +4627,7 @@
                   <a:solidFill>
                     <a:schemeClr val="tx1"/>
                   </a:solidFill>
+                  <a:latin typeface="Arial" panose="020B0604020202020204" pitchFamily="34" charset="0"/>
                   <a:cs typeface="Arial" panose="020B0604020202020204" pitchFamily="34" charset="0"/>
                 </a:rPr>
                 <a:t>(D)</a:t>
@@ -4565,7 +4649,7 @@
           </p:nvSpPr>
           <p:spPr>
             <a:xfrm>
-              <a:off x="3967167" y="4743341"/>
+              <a:off x="3967167" y="4651901"/>
               <a:ext cx="455804" cy="216838"/>
             </a:xfrm>
             <a:prstGeom prst="rect">
@@ -4602,6 +4686,7 @@
                   <a:solidFill>
                     <a:schemeClr val="tx1"/>
                   </a:solidFill>
+                  <a:latin typeface="Arial" panose="020B0604020202020204" pitchFamily="34" charset="0"/>
                   <a:cs typeface="Arial" panose="020B0604020202020204" pitchFamily="34" charset="0"/>
                 </a:rPr>
                 <a:t>(E)</a:t>
@@ -5169,7 +5254,7 @@
           </p:nvCxnSpPr>
           <p:spPr>
             <a:xfrm>
-              <a:off x="5497139" y="1363796"/>
+              <a:off x="5477256" y="1298448"/>
               <a:ext cx="981959" cy="0"/>
             </a:xfrm>
             <a:prstGeom prst="straightConnector1">
@@ -5222,7 +5307,7 @@
           </p:nvCxnSpPr>
           <p:spPr>
             <a:xfrm>
-              <a:off x="4242816" y="2956376"/>
+              <a:off x="4215384" y="2842076"/>
               <a:ext cx="981959" cy="0"/>
             </a:xfrm>
             <a:prstGeom prst="straightConnector1">
@@ -5275,7 +5360,7 @@
           </p:nvCxnSpPr>
           <p:spPr>
             <a:xfrm>
-              <a:off x="5495544" y="2956376"/>
+              <a:off x="5477256" y="2842076"/>
               <a:ext cx="981959" cy="0"/>
             </a:xfrm>
             <a:prstGeom prst="straightConnector1">
@@ -5328,7 +5413,7 @@
           </p:nvCxnSpPr>
           <p:spPr>
             <a:xfrm>
-              <a:off x="4242816" y="4500378"/>
+              <a:off x="4215384" y="4316228"/>
               <a:ext cx="981959" cy="0"/>
             </a:xfrm>
             <a:prstGeom prst="straightConnector1">
@@ -5381,7 +5466,7 @@
           </p:nvCxnSpPr>
           <p:spPr>
             <a:xfrm>
-              <a:off x="5495544" y="4500378"/>
+              <a:off x="5477256" y="4316228"/>
               <a:ext cx="981959" cy="0"/>
             </a:xfrm>
             <a:prstGeom prst="straightConnector1">
@@ -5434,7 +5519,7 @@
           </p:nvCxnSpPr>
           <p:spPr>
             <a:xfrm>
-              <a:off x="4242816" y="6052473"/>
+              <a:off x="4215384" y="5795295"/>
               <a:ext cx="981959" cy="0"/>
             </a:xfrm>
             <a:prstGeom prst="straightConnector1">
@@ -5487,7 +5572,7 @@
           </p:nvCxnSpPr>
           <p:spPr>
             <a:xfrm>
-              <a:off x="5495544" y="6052473"/>
+              <a:off x="5477256" y="5795295"/>
               <a:ext cx="981959" cy="0"/>
             </a:xfrm>
             <a:prstGeom prst="straightConnector1">

</xml_diff>